<commit_message>
DeepFuzz: Automatic Generation of Syntax Valid C Programs for Fuzz Testing
</commit_message>
<xml_diff>
--- a/Presentation/20190307_Rabin.pptx
+++ b/Presentation/20190307_Rabin.pptx
@@ -223,7 +223,7 @@
             <a:fld id="{CB3D2ACE-279A-4319-8204-FE4A3DAF1277}" type="datetimeFigureOut">
               <a:rPr lang="en-US" smtClean="0"/>
               <a:pPr/>
-              <a:t>3/7/19</a:t>
+              <a:t>9/5/19</a:t>
             </a:fld>
             <a:endParaRPr lang="en-US"/>
           </a:p>
@@ -2113,7 +2113,7 @@
             <a:fld id="{B61BEF0D-F0BB-DE4B-95CE-6DB70DBA9567}" type="datetimeFigureOut">
               <a:rPr lang="en-US" smtClean="0"/>
               <a:pPr/>
-              <a:t>3/7/19</a:t>
+              <a:t>9/5/19</a:t>
             </a:fld>
             <a:endParaRPr lang="en-US" dirty="0"/>
           </a:p>
@@ -2294,7 +2294,7 @@
             <a:fld id="{B61BEF0D-F0BB-DE4B-95CE-6DB70DBA9567}" type="datetimeFigureOut">
               <a:rPr lang="en-US" smtClean="0"/>
               <a:pPr/>
-              <a:t>3/7/19</a:t>
+              <a:t>9/5/19</a:t>
             </a:fld>
             <a:endParaRPr lang="en-US" dirty="0"/>
           </a:p>
@@ -2476,7 +2476,7 @@
             <a:fld id="{B61BEF0D-F0BB-DE4B-95CE-6DB70DBA9567}" type="datetimeFigureOut">
               <a:rPr lang="en-US" smtClean="0"/>
               <a:pPr/>
-              <a:t>3/7/19</a:t>
+              <a:t>9/5/19</a:t>
             </a:fld>
             <a:endParaRPr lang="en-US" dirty="0"/>
           </a:p>
@@ -2648,7 +2648,7 @@
             <a:fld id="{B61BEF0D-F0BB-DE4B-95CE-6DB70DBA9567}" type="datetimeFigureOut">
               <a:rPr lang="en-US" smtClean="0"/>
               <a:pPr/>
-              <a:t>3/7/19</a:t>
+              <a:t>9/5/19</a:t>
             </a:fld>
             <a:endParaRPr lang="en-US" dirty="0"/>
           </a:p>
@@ -2963,7 +2963,7 @@
             <a:fld id="{B61BEF0D-F0BB-DE4B-95CE-6DB70DBA9567}" type="datetimeFigureOut">
               <a:rPr lang="en-US" smtClean="0"/>
               <a:pPr/>
-              <a:t>3/7/19</a:t>
+              <a:t>9/5/19</a:t>
             </a:fld>
             <a:endParaRPr lang="en-US" dirty="0"/>
           </a:p>
@@ -3351,7 +3351,7 @@
             <a:fld id="{B61BEF0D-F0BB-DE4B-95CE-6DB70DBA9567}" type="datetimeFigureOut">
               <a:rPr lang="en-US" smtClean="0"/>
               <a:pPr/>
-              <a:t>3/7/19</a:t>
+              <a:t>9/5/19</a:t>
             </a:fld>
             <a:endParaRPr lang="en-US" dirty="0"/>
           </a:p>
@@ -3787,7 +3787,7 @@
             <a:fld id="{B61BEF0D-F0BB-DE4B-95CE-6DB70DBA9567}" type="datetimeFigureOut">
               <a:rPr lang="en-US" smtClean="0"/>
               <a:pPr/>
-              <a:t>3/7/19</a:t>
+              <a:t>9/5/19</a:t>
             </a:fld>
             <a:endParaRPr lang="en-US" dirty="0"/>
           </a:p>
@@ -3907,7 +3907,7 @@
             <a:fld id="{B61BEF0D-F0BB-DE4B-95CE-6DB70DBA9567}" type="datetimeFigureOut">
               <a:rPr lang="en-US" smtClean="0"/>
               <a:pPr/>
-              <a:t>3/7/19</a:t>
+              <a:t>9/5/19</a:t>
             </a:fld>
             <a:endParaRPr lang="en-US" dirty="0"/>
           </a:p>
@@ -4004,7 +4004,7 @@
             <a:fld id="{B61BEF0D-F0BB-DE4B-95CE-6DB70DBA9567}" type="datetimeFigureOut">
               <a:rPr lang="en-US" smtClean="0"/>
               <a:pPr/>
-              <a:t>3/7/19</a:t>
+              <a:t>9/5/19</a:t>
             </a:fld>
             <a:endParaRPr lang="en-US" dirty="0"/>
           </a:p>
@@ -4356,7 +4356,7 @@
             <a:fld id="{B61BEF0D-F0BB-DE4B-95CE-6DB70DBA9567}" type="datetimeFigureOut">
               <a:rPr lang="en-US" smtClean="0"/>
               <a:pPr/>
-              <a:t>3/7/19</a:t>
+              <a:t>9/5/19</a:t>
             </a:fld>
             <a:endParaRPr lang="en-US" dirty="0"/>
           </a:p>
@@ -4783,7 +4783,7 @@
             <a:fld id="{B61BEF0D-F0BB-DE4B-95CE-6DB70DBA9567}" type="datetimeFigureOut">
               <a:rPr lang="en-US" smtClean="0"/>
               <a:pPr/>
-              <a:t>3/7/19</a:t>
+              <a:t>9/5/19</a:t>
             </a:fld>
             <a:endParaRPr lang="en-US" dirty="0"/>
           </a:p>
@@ -5066,7 +5066,7 @@
             <a:fld id="{B61BEF0D-F0BB-DE4B-95CE-6DB70DBA9567}" type="datetimeFigureOut">
               <a:rPr lang="en-US" smtClean="0"/>
               <a:pPr/>
-              <a:t>3/7/19</a:t>
+              <a:t>9/5/19</a:t>
             </a:fld>
             <a:endParaRPr lang="en-US" dirty="0"/>
           </a:p>

</xml_diff>